<commit_message>
Fixes for the future
Linkify a couple of things I missed, complete a reference and add DOI.
</commit_message>
<xml_diff>
--- a/packaging-short.pptx
+++ b/packaging-short.pptx
@@ -23166,7 +23166,7 @@
               </a:lnSpc>
             </a:pPr>
             <a:r>
-              <a:rPr lang="en-US" dirty="0" err="1">
+              <a:rPr lang="en-US" dirty="0">
                 <a:hlinkClick r:id="rId4"/>
               </a:rPr>
               <a:t>pyscaffold.org</a:t>
@@ -25067,18 +25067,30 @@
             </a:r>
             <a:r>
               <a:rPr lang="en-US" sz="1400" dirty="0"/>
-              <a:t>(see https://python-</a:t>
-            </a:r>
-            <a:r>
-              <a:rPr lang="en-US" sz="1400" dirty="0" err="1"/>
+              <a:t>(see </a:t>
+            </a:r>
+            <a:r>
+              <a:rPr lang="en-US" sz="1400" dirty="0">
+                <a:hlinkClick r:id="rId2"/>
+              </a:rPr>
+              <a:t>https://python-</a:t>
+            </a:r>
+            <a:r>
+              <a:rPr lang="en-US" sz="1400" dirty="0" err="1">
+                <a:hlinkClick r:id="rId2"/>
+              </a:rPr>
               <a:t>poetry.org</a:t>
             </a:r>
             <a:r>
-              <a:rPr lang="en-US" sz="1400" dirty="0"/>
+              <a:rPr lang="en-US" sz="1400" dirty="0">
+                <a:hlinkClick r:id="rId2"/>
+              </a:rPr>
               <a:t>/docs/</a:t>
             </a:r>
             <a:r>
-              <a:rPr lang="en-US" sz="1400" dirty="0" err="1"/>
+              <a:rPr lang="en-US" sz="1400" dirty="0" err="1">
+                <a:hlinkClick r:id="rId2"/>
+              </a:rPr>
               <a:t>pyproject</a:t>
             </a:r>
             <a:r>
@@ -30275,7 +30287,7 @@
           <a:lstStyle/>
           <a:p>
             <a:r>
-              <a:rPr lang="en-US" dirty="0" err="1">
+              <a:rPr lang="en-US" dirty="0">
                 <a:solidFill>
                   <a:schemeClr val="accent1">
                     <a:lumMod val="75000"/>
@@ -30284,13 +30296,6 @@
               </a:rPr>
               <a:t>spack.readthedocs.io</a:t>
             </a:r>
-            <a:endParaRPr lang="en-US" dirty="0">
-              <a:solidFill>
-                <a:schemeClr val="accent1">
-                  <a:lumMod val="75000"/>
-                </a:schemeClr>
-              </a:solidFill>
-            </a:endParaRPr>
           </a:p>
         </p:txBody>
       </p:sp>
@@ -31983,73 +31988,7 @@
               <a:rPr lang="en-US" sz="1600" dirty="0">
                 <a:hlinkClick r:id="rId4"/>
               </a:rPr>
-              <a:t>https://</a:t>
-            </a:r>
-            <a:r>
-              <a:rPr lang="en-US" sz="1600" dirty="0" err="1">
-                <a:hlinkClick r:id="rId4"/>
-              </a:rPr>
-              <a:t>github.com</a:t>
-            </a:r>
-            <a:r>
-              <a:rPr lang="en-US" sz="1600" dirty="0">
-                <a:hlinkClick r:id="rId4"/>
-              </a:rPr>
-              <a:t>/</a:t>
-            </a:r>
-            <a:r>
-              <a:rPr lang="en-US" sz="1600" dirty="0" err="1">
-                <a:hlinkClick r:id="rId4"/>
-              </a:rPr>
-              <a:t>mpbelhorn</a:t>
-            </a:r>
-            <a:r>
-              <a:rPr lang="en-US" sz="1600" dirty="0">
-                <a:hlinkClick r:id="rId4"/>
-              </a:rPr>
-              <a:t>/</a:t>
-            </a:r>
-            <a:r>
-              <a:rPr lang="en-US" sz="1600" dirty="0" err="1">
-                <a:hlinkClick r:id="rId4"/>
-              </a:rPr>
-              <a:t>olcf</a:t>
-            </a:r>
-            <a:r>
-              <a:rPr lang="en-US" sz="1600" dirty="0">
-                <a:hlinkClick r:id="rId4"/>
-              </a:rPr>
-              <a:t>-</a:t>
-            </a:r>
-            <a:r>
-              <a:rPr lang="en-US" sz="1600" dirty="0" err="1">
-                <a:hlinkClick r:id="rId4"/>
-              </a:rPr>
-              <a:t>spack</a:t>
-            </a:r>
-            <a:r>
-              <a:rPr lang="en-US" sz="1600" dirty="0">
-                <a:hlinkClick r:id="rId4"/>
-              </a:rPr>
-              <a:t>-environments/blob/develop/hosts/frontier/</a:t>
-            </a:r>
-            <a:r>
-              <a:rPr lang="en-US" sz="1600" dirty="0" err="1">
-                <a:hlinkClick r:id="rId4"/>
-              </a:rPr>
-              <a:t>envs</a:t>
-            </a:r>
-            <a:r>
-              <a:rPr lang="en-US" sz="1600" dirty="0">
-                <a:hlinkClick r:id="rId4"/>
-              </a:rPr>
-              <a:t>/base/</a:t>
-            </a:r>
-            <a:r>
-              <a:rPr lang="en-US" sz="1600" dirty="0" err="1">
-                <a:hlinkClick r:id="rId4"/>
-              </a:rPr>
-              <a:t>spack.yaml</a:t>
+              <a:t>https://github.com/mpbelhorn/olcf-spack-environments/blob/develop/hosts/frontier/envs/base/spack.yaml</a:t>
             </a:r>
             <a:endParaRPr lang="en-US" sz="1600" dirty="0"/>
           </a:p>
@@ -48525,21 +48464,6 @@
 </file>
 
 <file path=customXml/item1.xml><?xml version="1.0" encoding="utf-8"?>
-<p:properties xmlns:p="http://schemas.microsoft.com/office/2006/metadata/properties" xmlns:xsi="http://www.w3.org/2001/XMLSchema-instance" xmlns:pc="http://schemas.microsoft.com/office/infopath/2007/PartnerControls">
-  <documentManagement/>
-</p:properties>
-</file>
-
-<file path=customXml/item2.xml><?xml version="1.0" encoding="utf-8"?>
-<?mso-contentType ?>
-<FormTemplates xmlns="http://schemas.microsoft.com/sharepoint/v3/contenttype/forms">
-  <Display>DocumentLibraryForm</Display>
-  <Edit>DocumentLibraryForm</Edit>
-  <New>DocumentLibraryForm</New>
-</FormTemplates>
-</file>
-
-<file path=customXml/item3.xml><?xml version="1.0" encoding="utf-8"?>
 <ct:contentTypeSchema xmlns:ct="http://schemas.microsoft.com/office/2006/metadata/contentType" xmlns:ma="http://schemas.microsoft.com/office/2006/metadata/properties/metaAttributes" ct:_="" ma:_="" ma:contentTypeName="Document" ma:contentTypeID="0x010100565464437F680748A68B85EB6594EA7D" ma:contentTypeVersion="0" ma:contentTypeDescription="Create a new document." ma:contentTypeScope="" ma:versionID="fe3f4dd58d5914c51cfc6deaa8ad845c">
   <xsd:schema xmlns:xsd="http://www.w3.org/2001/XMLSchema" xmlns:p="http://schemas.microsoft.com/office/2006/metadata/properties" targetNamespace="http://schemas.microsoft.com/office/2006/metadata/properties" ma:root="true" ma:fieldsID="4aeb20c0e3442673af7ee10786458764">
     <xsd:element name="properties">
@@ -48588,7 +48512,37 @@
 </ct:contentTypeSchema>
 </file>
 
+<file path=customXml/item2.xml><?xml version="1.0" encoding="utf-8"?>
+<p:properties xmlns:p="http://schemas.microsoft.com/office/2006/metadata/properties" xmlns:xsi="http://www.w3.org/2001/XMLSchema-instance" xmlns:pc="http://schemas.microsoft.com/office/infopath/2007/PartnerControls">
+  <documentManagement/>
+</p:properties>
+</file>
+
+<file path=customXml/item3.xml><?xml version="1.0" encoding="utf-8"?>
+<?mso-contentType ?>
+<FormTemplates xmlns="http://schemas.microsoft.com/sharepoint/v3/contenttype/forms">
+  <Display>DocumentLibraryForm</Display>
+  <Edit>DocumentLibraryForm</Edit>
+  <New>DocumentLibraryForm</New>
+</FormTemplates>
+</file>
+
 <file path=customXml/itemProps1.xml><?xml version="1.0" encoding="utf-8"?>
+<ds:datastoreItem xmlns:ds="http://schemas.openxmlformats.org/officeDocument/2006/customXml" ds:itemID="{E8DB7DEB-074E-4EE8-9B6E-FD277323109C}">
+  <ds:schemaRefs>
+    <ds:schemaRef ds:uri="http://schemas.microsoft.com/office/2006/metadata/contentType"/>
+    <ds:schemaRef ds:uri="http://schemas.microsoft.com/office/2006/metadata/properties/metaAttributes"/>
+    <ds:schemaRef ds:uri="http://www.w3.org/2001/XMLSchema"/>
+    <ds:schemaRef ds:uri="http://schemas.microsoft.com/office/2006/metadata/properties"/>
+    <ds:schemaRef ds:uri="http://schemas.openxmlformats.org/package/2006/metadata/core-properties"/>
+    <ds:schemaRef ds:uri="http://purl.org/dc/elements/1.1/"/>
+    <ds:schemaRef ds:uri="http://purl.org/dc/terms/"/>
+    <ds:schemaRef ds:uri="http://schemas.microsoft.com/office/internal/2005/internalDocumentation"/>
+  </ds:schemaRefs>
+</ds:datastoreItem>
+</file>
+
+<file path=customXml/itemProps2.xml><?xml version="1.0" encoding="utf-8"?>
 <ds:datastoreItem xmlns:ds="http://schemas.openxmlformats.org/officeDocument/2006/customXml" ds:itemID="{A50EC660-24D0-43A0-AE5E-E274115E726B}">
   <ds:schemaRefs>
     <ds:schemaRef ds:uri="http://purl.org/dc/elements/1.1/"/>
@@ -48603,25 +48557,10 @@
 </ds:datastoreItem>
 </file>
 
-<file path=customXml/itemProps2.xml><?xml version="1.0" encoding="utf-8"?>
+<file path=customXml/itemProps3.xml><?xml version="1.0" encoding="utf-8"?>
 <ds:datastoreItem xmlns:ds="http://schemas.openxmlformats.org/officeDocument/2006/customXml" ds:itemID="{19E20559-B232-4371-8690-E3D8007EDB82}">
   <ds:schemaRefs>
     <ds:schemaRef ds:uri="http://schemas.microsoft.com/sharepoint/v3/contenttype/forms"/>
   </ds:schemaRefs>
 </ds:datastoreItem>
-</file>
-
-<file path=customXml/itemProps3.xml><?xml version="1.0" encoding="utf-8"?>
-<ds:datastoreItem xmlns:ds="http://schemas.openxmlformats.org/officeDocument/2006/customXml" ds:itemID="{E8DB7DEB-074E-4EE8-9B6E-FD277323109C}">
-  <ds:schemaRefs>
-    <ds:schemaRef ds:uri="http://schemas.microsoft.com/office/2006/metadata/contentType"/>
-    <ds:schemaRef ds:uri="http://schemas.microsoft.com/office/2006/metadata/properties/metaAttributes"/>
-    <ds:schemaRef ds:uri="http://www.w3.org/2001/XMLSchema"/>
-    <ds:schemaRef ds:uri="http://schemas.microsoft.com/office/2006/metadata/properties"/>
-    <ds:schemaRef ds:uri="http://schemas.openxmlformats.org/package/2006/metadata/core-properties"/>
-    <ds:schemaRef ds:uri="http://purl.org/dc/elements/1.1/"/>
-    <ds:schemaRef ds:uri="http://purl.org/dc/terms/"/>
-    <ds:schemaRef ds:uri="http://schemas.microsoft.com/office/internal/2005/internalDocumentation"/>
-  </ds:schemaRefs>
-</ds:datastoreItem>
 </file>
</xml_diff>